<commit_message>
Added `in a nutshell` sections
</commit_message>
<xml_diff>
--- a/docs/charts.pptx
+++ b/docs/charts.pptx
@@ -6,6 +6,7 @@
   </p:sldMasterIdLst>
   <p:sldIdLst>
     <p:sldId id="256" r:id="rId2"/>
+    <p:sldId id="257" r:id="rId3"/>
   </p:sldIdLst>
   <p:sldSz cx="12192000" cy="6858000"/>
   <p:notesSz cx="6858000" cy="9144000"/>
@@ -259,7 +260,7 @@
           <a:p>
             <a:fld id="{58537782-5515-4277-8890-BE805010C87F}" type="datetimeFigureOut">
               <a:rPr lang="en-US" smtClean="0"/>
-              <a:t>3/3/2021</a:t>
+              <a:t>3/4/2021</a:t>
             </a:fld>
             <a:endParaRPr lang="en-US"/>
           </a:p>
@@ -457,7 +458,7 @@
           <a:p>
             <a:fld id="{58537782-5515-4277-8890-BE805010C87F}" type="datetimeFigureOut">
               <a:rPr lang="en-US" smtClean="0"/>
-              <a:t>3/3/2021</a:t>
+              <a:t>3/4/2021</a:t>
             </a:fld>
             <a:endParaRPr lang="en-US"/>
           </a:p>
@@ -665,7 +666,7 @@
           <a:p>
             <a:fld id="{58537782-5515-4277-8890-BE805010C87F}" type="datetimeFigureOut">
               <a:rPr lang="en-US" smtClean="0"/>
-              <a:t>3/3/2021</a:t>
+              <a:t>3/4/2021</a:t>
             </a:fld>
             <a:endParaRPr lang="en-US"/>
           </a:p>
@@ -863,7 +864,7 @@
           <a:p>
             <a:fld id="{58537782-5515-4277-8890-BE805010C87F}" type="datetimeFigureOut">
               <a:rPr lang="en-US" smtClean="0"/>
-              <a:t>3/3/2021</a:t>
+              <a:t>3/4/2021</a:t>
             </a:fld>
             <a:endParaRPr lang="en-US"/>
           </a:p>
@@ -1138,7 +1139,7 @@
           <a:p>
             <a:fld id="{58537782-5515-4277-8890-BE805010C87F}" type="datetimeFigureOut">
               <a:rPr lang="en-US" smtClean="0"/>
-              <a:t>3/3/2021</a:t>
+              <a:t>3/4/2021</a:t>
             </a:fld>
             <a:endParaRPr lang="en-US"/>
           </a:p>
@@ -1403,7 +1404,7 @@
           <a:p>
             <a:fld id="{58537782-5515-4277-8890-BE805010C87F}" type="datetimeFigureOut">
               <a:rPr lang="en-US" smtClean="0"/>
-              <a:t>3/3/2021</a:t>
+              <a:t>3/4/2021</a:t>
             </a:fld>
             <a:endParaRPr lang="en-US"/>
           </a:p>
@@ -1815,7 +1816,7 @@
           <a:p>
             <a:fld id="{58537782-5515-4277-8890-BE805010C87F}" type="datetimeFigureOut">
               <a:rPr lang="en-US" smtClean="0"/>
-              <a:t>3/3/2021</a:t>
+              <a:t>3/4/2021</a:t>
             </a:fld>
             <a:endParaRPr lang="en-US"/>
           </a:p>
@@ -1956,7 +1957,7 @@
           <a:p>
             <a:fld id="{58537782-5515-4277-8890-BE805010C87F}" type="datetimeFigureOut">
               <a:rPr lang="en-US" smtClean="0"/>
-              <a:t>3/3/2021</a:t>
+              <a:t>3/4/2021</a:t>
             </a:fld>
             <a:endParaRPr lang="en-US"/>
           </a:p>
@@ -2069,7 +2070,7 @@
           <a:p>
             <a:fld id="{58537782-5515-4277-8890-BE805010C87F}" type="datetimeFigureOut">
               <a:rPr lang="en-US" smtClean="0"/>
-              <a:t>3/3/2021</a:t>
+              <a:t>3/4/2021</a:t>
             </a:fld>
             <a:endParaRPr lang="en-US"/>
           </a:p>
@@ -2380,7 +2381,7 @@
           <a:p>
             <a:fld id="{58537782-5515-4277-8890-BE805010C87F}" type="datetimeFigureOut">
               <a:rPr lang="en-US" smtClean="0"/>
-              <a:t>3/3/2021</a:t>
+              <a:t>3/4/2021</a:t>
             </a:fld>
             <a:endParaRPr lang="en-US"/>
           </a:p>
@@ -2668,7 +2669,7 @@
           <a:p>
             <a:fld id="{58537782-5515-4277-8890-BE805010C87F}" type="datetimeFigureOut">
               <a:rPr lang="en-US" smtClean="0"/>
-              <a:t>3/3/2021</a:t>
+              <a:t>3/4/2021</a:t>
             </a:fld>
             <a:endParaRPr lang="en-US"/>
           </a:p>
@@ -2909,7 +2910,7 @@
           <a:p>
             <a:fld id="{58537782-5515-4277-8890-BE805010C87F}" type="datetimeFigureOut">
               <a:rPr lang="en-US" smtClean="0"/>
-              <a:t>3/3/2021</a:t>
+              <a:t>3/4/2021</a:t>
             </a:fld>
             <a:endParaRPr lang="en-US"/>
           </a:p>
@@ -4119,6 +4120,887 @@
 </p:sld>
 </file>
 
+<file path=ppt/slides/slide2.xml><?xml version="1.0" encoding="utf-8"?>
+<p:sld xmlns:a="http://schemas.openxmlformats.org/drawingml/2006/main" xmlns:r="http://schemas.openxmlformats.org/officeDocument/2006/relationships" xmlns:p="http://schemas.openxmlformats.org/presentationml/2006/main">
+  <p:cSld>
+    <p:spTree>
+      <p:nvGrpSpPr>
+        <p:cNvPr id="1" name=""/>
+        <p:cNvGrpSpPr/>
+        <p:nvPr/>
+      </p:nvGrpSpPr>
+      <p:grpSpPr>
+        <a:xfrm>
+          <a:off x="0" y="0"/>
+          <a:ext cx="0" cy="0"/>
+          <a:chOff x="0" y="0"/>
+          <a:chExt cx="0" cy="0"/>
+        </a:xfrm>
+      </p:grpSpPr>
+      <p:cxnSp>
+        <p:nvCxnSpPr>
+          <p:cNvPr id="15" name="Straight Arrow Connector 14">
+            <a:extLst>
+              <a:ext uri="{FF2B5EF4-FFF2-40B4-BE49-F238E27FC236}">
+                <a16:creationId xmlns:a16="http://schemas.microsoft.com/office/drawing/2014/main" id="{278F63D8-5270-4C57-8E75-9D195F10421C}"/>
+              </a:ext>
+            </a:extLst>
+          </p:cNvPr>
+          <p:cNvCxnSpPr>
+            <a:stCxn id="11" idx="0"/>
+            <a:endCxn id="9" idx="2"/>
+          </p:cNvCxnSpPr>
+          <p:nvPr/>
+        </p:nvCxnSpPr>
+        <p:spPr>
+          <a:xfrm flipV="1">
+            <a:off x="2724583" y="927186"/>
+            <a:ext cx="3118351" cy="400861"/>
+          </a:xfrm>
+          <a:prstGeom prst="straightConnector1">
+            <a:avLst/>
+          </a:prstGeom>
+          <a:ln w="28575">
+            <a:prstDash val="dash"/>
+            <a:tailEnd type="triangle"/>
+          </a:ln>
+          <a:effectLst>
+            <a:outerShdw blurRad="50800" dist="38100" dir="2700000" algn="tl" rotWithShape="0">
+              <a:prstClr val="black">
+                <a:alpha val="40000"/>
+              </a:prstClr>
+            </a:outerShdw>
+          </a:effectLst>
+        </p:spPr>
+        <p:style>
+          <a:lnRef idx="3">
+            <a:schemeClr val="accent6"/>
+          </a:lnRef>
+          <a:fillRef idx="0">
+            <a:schemeClr val="accent6"/>
+          </a:fillRef>
+          <a:effectRef idx="2">
+            <a:schemeClr val="accent6"/>
+          </a:effectRef>
+          <a:fontRef idx="minor">
+            <a:schemeClr val="tx1"/>
+          </a:fontRef>
+        </p:style>
+      </p:cxnSp>
+      <p:cxnSp>
+        <p:nvCxnSpPr>
+          <p:cNvPr id="25" name="Straight Arrow Connector 24">
+            <a:extLst>
+              <a:ext uri="{FF2B5EF4-FFF2-40B4-BE49-F238E27FC236}">
+                <a16:creationId xmlns:a16="http://schemas.microsoft.com/office/drawing/2014/main" id="{63D23E90-AFCC-4F28-B2F3-2AC1DB22F8A7}"/>
+              </a:ext>
+            </a:extLst>
+          </p:cNvPr>
+          <p:cNvCxnSpPr>
+            <a:cxnSpLocks/>
+            <a:stCxn id="4" idx="0"/>
+            <a:endCxn id="11" idx="2"/>
+          </p:cNvCxnSpPr>
+          <p:nvPr/>
+        </p:nvCxnSpPr>
+        <p:spPr>
+          <a:xfrm flipV="1">
+            <a:off x="1202568" y="1697379"/>
+            <a:ext cx="1522015" cy="513788"/>
+          </a:xfrm>
+          <a:prstGeom prst="straightConnector1">
+            <a:avLst/>
+          </a:prstGeom>
+          <a:ln w="28575">
+            <a:prstDash val="dash"/>
+            <a:tailEnd type="triangle"/>
+          </a:ln>
+          <a:effectLst>
+            <a:outerShdw blurRad="50800" dist="38100" dir="2700000" algn="tl" rotWithShape="0">
+              <a:prstClr val="black">
+                <a:alpha val="40000"/>
+              </a:prstClr>
+            </a:outerShdw>
+          </a:effectLst>
+        </p:spPr>
+        <p:style>
+          <a:lnRef idx="3">
+            <a:schemeClr val="accent6"/>
+          </a:lnRef>
+          <a:fillRef idx="0">
+            <a:schemeClr val="accent6"/>
+          </a:fillRef>
+          <a:effectRef idx="2">
+            <a:schemeClr val="accent6"/>
+          </a:effectRef>
+          <a:fontRef idx="minor">
+            <a:schemeClr val="tx1"/>
+          </a:fontRef>
+        </p:style>
+      </p:cxnSp>
+      <p:cxnSp>
+        <p:nvCxnSpPr>
+          <p:cNvPr id="28" name="Straight Arrow Connector 27">
+            <a:extLst>
+              <a:ext uri="{FF2B5EF4-FFF2-40B4-BE49-F238E27FC236}">
+                <a16:creationId xmlns:a16="http://schemas.microsoft.com/office/drawing/2014/main" id="{B214DDFE-9FE8-41C9-BDF8-8CF6006B599A}"/>
+              </a:ext>
+            </a:extLst>
+          </p:cNvPr>
+          <p:cNvCxnSpPr>
+            <a:cxnSpLocks/>
+            <a:stCxn id="19" idx="0"/>
+            <a:endCxn id="11" idx="2"/>
+          </p:cNvCxnSpPr>
+          <p:nvPr/>
+        </p:nvCxnSpPr>
+        <p:spPr>
+          <a:xfrm flipH="1" flipV="1">
+            <a:off x="2724583" y="1697379"/>
+            <a:ext cx="1128319" cy="513788"/>
+          </a:xfrm>
+          <a:prstGeom prst="straightConnector1">
+            <a:avLst/>
+          </a:prstGeom>
+          <a:ln w="28575">
+            <a:prstDash val="dash"/>
+            <a:tailEnd type="triangle"/>
+          </a:ln>
+          <a:effectLst>
+            <a:outerShdw blurRad="50800" dist="38100" dir="2700000" algn="tl" rotWithShape="0">
+              <a:prstClr val="black">
+                <a:alpha val="40000"/>
+              </a:prstClr>
+            </a:outerShdw>
+          </a:effectLst>
+        </p:spPr>
+        <p:style>
+          <a:lnRef idx="3">
+            <a:schemeClr val="accent6"/>
+          </a:lnRef>
+          <a:fillRef idx="0">
+            <a:schemeClr val="accent6"/>
+          </a:fillRef>
+          <a:effectRef idx="2">
+            <a:schemeClr val="accent6"/>
+          </a:effectRef>
+          <a:fontRef idx="minor">
+            <a:schemeClr val="tx1"/>
+          </a:fontRef>
+        </p:style>
+      </p:cxnSp>
+      <p:cxnSp>
+        <p:nvCxnSpPr>
+          <p:cNvPr id="31" name="Straight Arrow Connector 30">
+            <a:extLst>
+              <a:ext uri="{FF2B5EF4-FFF2-40B4-BE49-F238E27FC236}">
+                <a16:creationId xmlns:a16="http://schemas.microsoft.com/office/drawing/2014/main" id="{15E572E1-4293-42A9-B4A2-B378DB88409A}"/>
+              </a:ext>
+            </a:extLst>
+          </p:cNvPr>
+          <p:cNvCxnSpPr>
+            <a:cxnSpLocks/>
+            <a:stCxn id="24" idx="0"/>
+            <a:endCxn id="18" idx="2"/>
+          </p:cNvCxnSpPr>
+          <p:nvPr/>
+        </p:nvCxnSpPr>
+        <p:spPr>
+          <a:xfrm flipH="1" flipV="1">
+            <a:off x="9310956" y="1697379"/>
+            <a:ext cx="1459461" cy="513788"/>
+          </a:xfrm>
+          <a:prstGeom prst="straightConnector1">
+            <a:avLst/>
+          </a:prstGeom>
+          <a:ln w="28575">
+            <a:prstDash val="dash"/>
+            <a:tailEnd type="triangle"/>
+          </a:ln>
+          <a:effectLst>
+            <a:outerShdw blurRad="50800" dist="38100" dir="2700000" algn="tl" rotWithShape="0">
+              <a:prstClr val="black">
+                <a:alpha val="40000"/>
+              </a:prstClr>
+            </a:outerShdw>
+          </a:effectLst>
+        </p:spPr>
+        <p:style>
+          <a:lnRef idx="3">
+            <a:schemeClr val="accent6"/>
+          </a:lnRef>
+          <a:fillRef idx="0">
+            <a:schemeClr val="accent6"/>
+          </a:fillRef>
+          <a:effectRef idx="2">
+            <a:schemeClr val="accent6"/>
+          </a:effectRef>
+          <a:fontRef idx="minor">
+            <a:schemeClr val="tx1"/>
+          </a:fontRef>
+        </p:style>
+      </p:cxnSp>
+      <p:cxnSp>
+        <p:nvCxnSpPr>
+          <p:cNvPr id="34" name="Straight Arrow Connector 33">
+            <a:extLst>
+              <a:ext uri="{FF2B5EF4-FFF2-40B4-BE49-F238E27FC236}">
+                <a16:creationId xmlns:a16="http://schemas.microsoft.com/office/drawing/2014/main" id="{9FBF929B-3D4E-41B0-B39C-0B7294162466}"/>
+              </a:ext>
+            </a:extLst>
+          </p:cNvPr>
+          <p:cNvCxnSpPr>
+            <a:cxnSpLocks/>
+            <a:stCxn id="20" idx="0"/>
+            <a:endCxn id="18" idx="2"/>
+          </p:cNvCxnSpPr>
+          <p:nvPr/>
+        </p:nvCxnSpPr>
+        <p:spPr>
+          <a:xfrm flipV="1">
+            <a:off x="7511190" y="1697379"/>
+            <a:ext cx="1799766" cy="513788"/>
+          </a:xfrm>
+          <a:prstGeom prst="straightConnector1">
+            <a:avLst/>
+          </a:prstGeom>
+          <a:ln w="28575">
+            <a:prstDash val="dash"/>
+            <a:tailEnd type="triangle"/>
+          </a:ln>
+          <a:effectLst>
+            <a:outerShdw blurRad="50800" dist="38100" dir="2700000" algn="tl" rotWithShape="0">
+              <a:prstClr val="black">
+                <a:alpha val="40000"/>
+              </a:prstClr>
+            </a:outerShdw>
+          </a:effectLst>
+        </p:spPr>
+        <p:style>
+          <a:lnRef idx="3">
+            <a:schemeClr val="accent6"/>
+          </a:lnRef>
+          <a:fillRef idx="0">
+            <a:schemeClr val="accent6"/>
+          </a:fillRef>
+          <a:effectRef idx="2">
+            <a:schemeClr val="accent6"/>
+          </a:effectRef>
+          <a:fontRef idx="minor">
+            <a:schemeClr val="tx1"/>
+          </a:fontRef>
+        </p:style>
+      </p:cxnSp>
+      <p:cxnSp>
+        <p:nvCxnSpPr>
+          <p:cNvPr id="37" name="Straight Arrow Connector 36">
+            <a:extLst>
+              <a:ext uri="{FF2B5EF4-FFF2-40B4-BE49-F238E27FC236}">
+                <a16:creationId xmlns:a16="http://schemas.microsoft.com/office/drawing/2014/main" id="{2A98966E-C76A-4939-9A36-AAD728C2D5A9}"/>
+              </a:ext>
+            </a:extLst>
+          </p:cNvPr>
+          <p:cNvCxnSpPr>
+            <a:cxnSpLocks/>
+            <a:stCxn id="22" idx="0"/>
+            <a:endCxn id="20" idx="2"/>
+          </p:cNvCxnSpPr>
+          <p:nvPr/>
+        </p:nvCxnSpPr>
+        <p:spPr>
+          <a:xfrm flipV="1">
+            <a:off x="6601387" y="2580499"/>
+            <a:ext cx="909803" cy="479169"/>
+          </a:xfrm>
+          <a:prstGeom prst="straightConnector1">
+            <a:avLst/>
+          </a:prstGeom>
+          <a:ln w="28575">
+            <a:prstDash val="dash"/>
+            <a:tailEnd type="triangle"/>
+          </a:ln>
+          <a:effectLst>
+            <a:outerShdw blurRad="50800" dist="38100" dir="2700000" algn="tl" rotWithShape="0">
+              <a:prstClr val="black">
+                <a:alpha val="40000"/>
+              </a:prstClr>
+            </a:outerShdw>
+          </a:effectLst>
+        </p:spPr>
+        <p:style>
+          <a:lnRef idx="3">
+            <a:schemeClr val="accent6"/>
+          </a:lnRef>
+          <a:fillRef idx="0">
+            <a:schemeClr val="accent6"/>
+          </a:fillRef>
+          <a:effectRef idx="2">
+            <a:schemeClr val="accent6"/>
+          </a:effectRef>
+          <a:fontRef idx="minor">
+            <a:schemeClr val="tx1"/>
+          </a:fontRef>
+        </p:style>
+      </p:cxnSp>
+      <p:cxnSp>
+        <p:nvCxnSpPr>
+          <p:cNvPr id="39" name="Straight Arrow Connector 38">
+            <a:extLst>
+              <a:ext uri="{FF2B5EF4-FFF2-40B4-BE49-F238E27FC236}">
+                <a16:creationId xmlns:a16="http://schemas.microsoft.com/office/drawing/2014/main" id="{E3B384A1-2DF3-45D0-9307-165C435B6180}"/>
+              </a:ext>
+            </a:extLst>
+          </p:cNvPr>
+          <p:cNvCxnSpPr>
+            <a:cxnSpLocks/>
+            <a:stCxn id="23" idx="0"/>
+            <a:endCxn id="20" idx="2"/>
+          </p:cNvCxnSpPr>
+          <p:nvPr/>
+        </p:nvCxnSpPr>
+        <p:spPr>
+          <a:xfrm flipH="1" flipV="1">
+            <a:off x="7511190" y="2580499"/>
+            <a:ext cx="1031502" cy="479169"/>
+          </a:xfrm>
+          <a:prstGeom prst="straightConnector1">
+            <a:avLst/>
+          </a:prstGeom>
+          <a:ln w="28575">
+            <a:prstDash val="dash"/>
+            <a:tailEnd type="triangle"/>
+          </a:ln>
+          <a:effectLst>
+            <a:outerShdw blurRad="50800" dist="38100" dir="2700000" algn="tl" rotWithShape="0">
+              <a:prstClr val="black">
+                <a:alpha val="40000"/>
+              </a:prstClr>
+            </a:outerShdw>
+          </a:effectLst>
+        </p:spPr>
+        <p:style>
+          <a:lnRef idx="3">
+            <a:schemeClr val="accent6"/>
+          </a:lnRef>
+          <a:fillRef idx="0">
+            <a:schemeClr val="accent6"/>
+          </a:fillRef>
+          <a:effectRef idx="2">
+            <a:schemeClr val="accent6"/>
+          </a:effectRef>
+          <a:fontRef idx="minor">
+            <a:schemeClr val="tx1"/>
+          </a:fontRef>
+        </p:style>
+      </p:cxnSp>
+      <p:sp>
+        <p:nvSpPr>
+          <p:cNvPr id="11" name="TextBox 10">
+            <a:extLst>
+              <a:ext uri="{FF2B5EF4-FFF2-40B4-BE49-F238E27FC236}">
+                <a16:creationId xmlns:a16="http://schemas.microsoft.com/office/drawing/2014/main" id="{EDBE72D9-4ADA-404F-B2A9-AC392DED5B22}"/>
+              </a:ext>
+            </a:extLst>
+          </p:cNvPr>
+          <p:cNvSpPr txBox="1"/>
+          <p:nvPr/>
+        </p:nvSpPr>
+        <p:spPr>
+          <a:xfrm>
+            <a:off x="1596263" y="1328047"/>
+            <a:ext cx="2256639" cy="369332"/>
+          </a:xfrm>
+          <a:prstGeom prst="rect">
+            <a:avLst/>
+          </a:prstGeom>
+        </p:spPr>
+        <p:style>
+          <a:lnRef idx="0">
+            <a:schemeClr val="accent4"/>
+          </a:lnRef>
+          <a:fillRef idx="3">
+            <a:schemeClr val="accent4"/>
+          </a:fillRef>
+          <a:effectRef idx="3">
+            <a:schemeClr val="accent4"/>
+          </a:effectRef>
+          <a:fontRef idx="minor">
+            <a:schemeClr val="lt1"/>
+          </a:fontRef>
+        </p:style>
+        <p:txBody>
+          <a:bodyPr wrap="square" rtlCol="0">
+            <a:spAutoFit/>
+          </a:bodyPr>
+          <a:lstStyle/>
+          <a:p>
+            <a:pPr algn="ctr"/>
+            <a:r>
+              <a:rPr lang="en-US" b="1" dirty="0"/>
+              <a:t>account 1</a:t>
+            </a:r>
+            <a:endParaRPr lang="en-US" dirty="0"/>
+          </a:p>
+        </p:txBody>
+      </p:sp>
+      <p:sp>
+        <p:nvSpPr>
+          <p:cNvPr id="18" name="TextBox 17">
+            <a:extLst>
+              <a:ext uri="{FF2B5EF4-FFF2-40B4-BE49-F238E27FC236}">
+                <a16:creationId xmlns:a16="http://schemas.microsoft.com/office/drawing/2014/main" id="{8544099C-F5D4-4271-A7FE-56F40EB4DAE9}"/>
+              </a:ext>
+            </a:extLst>
+          </p:cNvPr>
+          <p:cNvSpPr txBox="1"/>
+          <p:nvPr/>
+        </p:nvSpPr>
+        <p:spPr>
+          <a:xfrm>
+            <a:off x="8182636" y="1328047"/>
+            <a:ext cx="2256639" cy="369332"/>
+          </a:xfrm>
+          <a:prstGeom prst="rect">
+            <a:avLst/>
+          </a:prstGeom>
+        </p:spPr>
+        <p:style>
+          <a:lnRef idx="0">
+            <a:schemeClr val="accent4"/>
+          </a:lnRef>
+          <a:fillRef idx="3">
+            <a:schemeClr val="accent4"/>
+          </a:fillRef>
+          <a:effectRef idx="3">
+            <a:schemeClr val="accent4"/>
+          </a:effectRef>
+          <a:fontRef idx="minor">
+            <a:schemeClr val="lt1"/>
+          </a:fontRef>
+        </p:style>
+        <p:txBody>
+          <a:bodyPr wrap="square" rtlCol="0">
+            <a:spAutoFit/>
+          </a:bodyPr>
+          <a:lstStyle/>
+          <a:p>
+            <a:pPr algn="ctr"/>
+            <a:r>
+              <a:rPr lang="en-US" b="1" dirty="0"/>
+              <a:t>account 2</a:t>
+            </a:r>
+            <a:endParaRPr lang="en-US" dirty="0"/>
+          </a:p>
+        </p:txBody>
+      </p:sp>
+      <p:sp>
+        <p:nvSpPr>
+          <p:cNvPr id="4" name="TextBox 3">
+            <a:extLst>
+              <a:ext uri="{FF2B5EF4-FFF2-40B4-BE49-F238E27FC236}">
+                <a16:creationId xmlns:a16="http://schemas.microsoft.com/office/drawing/2014/main" id="{2439C870-5C5D-4626-8B29-3409FF743AA6}"/>
+              </a:ext>
+            </a:extLst>
+          </p:cNvPr>
+          <p:cNvSpPr txBox="1"/>
+          <p:nvPr/>
+        </p:nvSpPr>
+        <p:spPr>
+          <a:xfrm flipH="1">
+            <a:off x="452144" y="2211167"/>
+            <a:ext cx="1500848" cy="369332"/>
+          </a:xfrm>
+          <a:prstGeom prst="rect">
+            <a:avLst/>
+          </a:prstGeom>
+        </p:spPr>
+        <p:style>
+          <a:lnRef idx="0">
+            <a:schemeClr val="accent2"/>
+          </a:lnRef>
+          <a:fillRef idx="3">
+            <a:schemeClr val="accent2"/>
+          </a:fillRef>
+          <a:effectRef idx="3">
+            <a:schemeClr val="accent2"/>
+          </a:effectRef>
+          <a:fontRef idx="minor">
+            <a:schemeClr val="lt1"/>
+          </a:fontRef>
+        </p:style>
+        <p:txBody>
+          <a:bodyPr wrap="square" rtlCol="0">
+            <a:spAutoFit/>
+          </a:bodyPr>
+          <a:lstStyle/>
+          <a:p>
+            <a:pPr algn="ctr"/>
+            <a:r>
+              <a:rPr lang="en-US" dirty="0"/>
+              <a:t>address 0</a:t>
+            </a:r>
+          </a:p>
+        </p:txBody>
+      </p:sp>
+      <p:sp>
+        <p:nvSpPr>
+          <p:cNvPr id="19" name="TextBox 18">
+            <a:extLst>
+              <a:ext uri="{FF2B5EF4-FFF2-40B4-BE49-F238E27FC236}">
+                <a16:creationId xmlns:a16="http://schemas.microsoft.com/office/drawing/2014/main" id="{1EEE4BBE-1724-44E9-802C-F15B0608191F}"/>
+              </a:ext>
+            </a:extLst>
+          </p:cNvPr>
+          <p:cNvSpPr txBox="1"/>
+          <p:nvPr/>
+        </p:nvSpPr>
+        <p:spPr>
+          <a:xfrm flipH="1">
+            <a:off x="3102478" y="2211167"/>
+            <a:ext cx="1500848" cy="369332"/>
+          </a:xfrm>
+          <a:prstGeom prst="rect">
+            <a:avLst/>
+          </a:prstGeom>
+        </p:spPr>
+        <p:style>
+          <a:lnRef idx="0">
+            <a:schemeClr val="accent2"/>
+          </a:lnRef>
+          <a:fillRef idx="3">
+            <a:schemeClr val="accent2"/>
+          </a:fillRef>
+          <a:effectRef idx="3">
+            <a:schemeClr val="accent2"/>
+          </a:effectRef>
+          <a:fontRef idx="minor">
+            <a:schemeClr val="lt1"/>
+          </a:fontRef>
+        </p:style>
+        <p:txBody>
+          <a:bodyPr wrap="square" rtlCol="0">
+            <a:spAutoFit/>
+          </a:bodyPr>
+          <a:lstStyle/>
+          <a:p>
+            <a:pPr algn="ctr"/>
+            <a:r>
+              <a:rPr lang="en-US" dirty="0"/>
+              <a:t>address 1</a:t>
+            </a:r>
+          </a:p>
+        </p:txBody>
+      </p:sp>
+      <p:sp>
+        <p:nvSpPr>
+          <p:cNvPr id="20" name="TextBox 19">
+            <a:extLst>
+              <a:ext uri="{FF2B5EF4-FFF2-40B4-BE49-F238E27FC236}">
+                <a16:creationId xmlns:a16="http://schemas.microsoft.com/office/drawing/2014/main" id="{0F6EE1F2-6821-4793-AE02-8F46DCE5C03D}"/>
+              </a:ext>
+            </a:extLst>
+          </p:cNvPr>
+          <p:cNvSpPr txBox="1"/>
+          <p:nvPr/>
+        </p:nvSpPr>
+        <p:spPr>
+          <a:xfrm flipH="1">
+            <a:off x="6760766" y="2211167"/>
+            <a:ext cx="1500848" cy="369332"/>
+          </a:xfrm>
+          <a:prstGeom prst="rect">
+            <a:avLst/>
+          </a:prstGeom>
+        </p:spPr>
+        <p:style>
+          <a:lnRef idx="0">
+            <a:schemeClr val="accent2"/>
+          </a:lnRef>
+          <a:fillRef idx="3">
+            <a:schemeClr val="accent2"/>
+          </a:fillRef>
+          <a:effectRef idx="3">
+            <a:schemeClr val="accent2"/>
+          </a:effectRef>
+          <a:fontRef idx="minor">
+            <a:schemeClr val="lt1"/>
+          </a:fontRef>
+        </p:style>
+        <p:txBody>
+          <a:bodyPr wrap="square" rtlCol="0">
+            <a:spAutoFit/>
+          </a:bodyPr>
+          <a:lstStyle/>
+          <a:p>
+            <a:pPr algn="ctr"/>
+            <a:r>
+              <a:rPr lang="en-US" dirty="0"/>
+              <a:t>address 0</a:t>
+            </a:r>
+          </a:p>
+        </p:txBody>
+      </p:sp>
+      <p:sp>
+        <p:nvSpPr>
+          <p:cNvPr id="24" name="TextBox 23">
+            <a:extLst>
+              <a:ext uri="{FF2B5EF4-FFF2-40B4-BE49-F238E27FC236}">
+                <a16:creationId xmlns:a16="http://schemas.microsoft.com/office/drawing/2014/main" id="{81ADE66B-A1B8-42F5-BD8F-2CAFF616F067}"/>
+              </a:ext>
+            </a:extLst>
+          </p:cNvPr>
+          <p:cNvSpPr txBox="1"/>
+          <p:nvPr/>
+        </p:nvSpPr>
+        <p:spPr>
+          <a:xfrm flipH="1">
+            <a:off x="10019993" y="2211167"/>
+            <a:ext cx="1500848" cy="369332"/>
+          </a:xfrm>
+          <a:prstGeom prst="rect">
+            <a:avLst/>
+          </a:prstGeom>
+        </p:spPr>
+        <p:style>
+          <a:lnRef idx="0">
+            <a:schemeClr val="accent2"/>
+          </a:lnRef>
+          <a:fillRef idx="3">
+            <a:schemeClr val="accent2"/>
+          </a:fillRef>
+          <a:effectRef idx="3">
+            <a:schemeClr val="accent2"/>
+          </a:effectRef>
+          <a:fontRef idx="minor">
+            <a:schemeClr val="lt1"/>
+          </a:fontRef>
+        </p:style>
+        <p:txBody>
+          <a:bodyPr wrap="square" rtlCol="0">
+            <a:spAutoFit/>
+          </a:bodyPr>
+          <a:lstStyle/>
+          <a:p>
+            <a:pPr algn="ctr"/>
+            <a:r>
+              <a:rPr lang="en-US" dirty="0"/>
+              <a:t>address 3</a:t>
+            </a:r>
+          </a:p>
+        </p:txBody>
+      </p:sp>
+      <p:sp>
+        <p:nvSpPr>
+          <p:cNvPr id="23" name="TextBox 22">
+            <a:extLst>
+              <a:ext uri="{FF2B5EF4-FFF2-40B4-BE49-F238E27FC236}">
+                <a16:creationId xmlns:a16="http://schemas.microsoft.com/office/drawing/2014/main" id="{0F8395D6-AC1D-4CA8-97AF-DE6F53E80239}"/>
+              </a:ext>
+            </a:extLst>
+          </p:cNvPr>
+          <p:cNvSpPr txBox="1"/>
+          <p:nvPr/>
+        </p:nvSpPr>
+        <p:spPr>
+          <a:xfrm flipH="1">
+            <a:off x="7792268" y="3059668"/>
+            <a:ext cx="1500848" cy="369332"/>
+          </a:xfrm>
+          <a:prstGeom prst="rect">
+            <a:avLst/>
+          </a:prstGeom>
+        </p:spPr>
+        <p:style>
+          <a:lnRef idx="0">
+            <a:schemeClr val="accent2"/>
+          </a:lnRef>
+          <a:fillRef idx="3">
+            <a:schemeClr val="accent2"/>
+          </a:fillRef>
+          <a:effectRef idx="3">
+            <a:schemeClr val="accent2"/>
+          </a:effectRef>
+          <a:fontRef idx="minor">
+            <a:schemeClr val="lt1"/>
+          </a:fontRef>
+        </p:style>
+        <p:txBody>
+          <a:bodyPr wrap="square" rtlCol="0">
+            <a:spAutoFit/>
+          </a:bodyPr>
+          <a:lstStyle/>
+          <a:p>
+            <a:pPr algn="ctr"/>
+            <a:r>
+              <a:rPr lang="en-US" dirty="0"/>
+              <a:t>address 2</a:t>
+            </a:r>
+          </a:p>
+        </p:txBody>
+      </p:sp>
+      <p:sp>
+        <p:nvSpPr>
+          <p:cNvPr id="22" name="TextBox 21">
+            <a:extLst>
+              <a:ext uri="{FF2B5EF4-FFF2-40B4-BE49-F238E27FC236}">
+                <a16:creationId xmlns:a16="http://schemas.microsoft.com/office/drawing/2014/main" id="{AF0E0774-11EE-485C-909A-ECBD2130AC5E}"/>
+              </a:ext>
+            </a:extLst>
+          </p:cNvPr>
+          <p:cNvSpPr txBox="1"/>
+          <p:nvPr/>
+        </p:nvSpPr>
+        <p:spPr>
+          <a:xfrm flipH="1">
+            <a:off x="5850963" y="3059668"/>
+            <a:ext cx="1500848" cy="369332"/>
+          </a:xfrm>
+          <a:prstGeom prst="rect">
+            <a:avLst/>
+          </a:prstGeom>
+        </p:spPr>
+        <p:style>
+          <a:lnRef idx="0">
+            <a:schemeClr val="accent2"/>
+          </a:lnRef>
+          <a:fillRef idx="3">
+            <a:schemeClr val="accent2"/>
+          </a:fillRef>
+          <a:effectRef idx="3">
+            <a:schemeClr val="accent2"/>
+          </a:effectRef>
+          <a:fontRef idx="minor">
+            <a:schemeClr val="lt1"/>
+          </a:fontRef>
+        </p:style>
+        <p:txBody>
+          <a:bodyPr wrap="square" rtlCol="0">
+            <a:spAutoFit/>
+          </a:bodyPr>
+          <a:lstStyle/>
+          <a:p>
+            <a:pPr algn="ctr"/>
+            <a:r>
+              <a:rPr lang="en-US" dirty="0"/>
+              <a:t>address 1</a:t>
+            </a:r>
+          </a:p>
+        </p:txBody>
+      </p:sp>
+      <p:cxnSp>
+        <p:nvCxnSpPr>
+          <p:cNvPr id="47" name="Straight Arrow Connector 46">
+            <a:extLst>
+              <a:ext uri="{FF2B5EF4-FFF2-40B4-BE49-F238E27FC236}">
+                <a16:creationId xmlns:a16="http://schemas.microsoft.com/office/drawing/2014/main" id="{174E9FFC-7CBA-4122-8C09-2A45845C405D}"/>
+              </a:ext>
+            </a:extLst>
+          </p:cNvPr>
+          <p:cNvCxnSpPr>
+            <a:cxnSpLocks/>
+            <a:stCxn id="18" idx="0"/>
+            <a:endCxn id="9" idx="2"/>
+          </p:cNvCxnSpPr>
+          <p:nvPr/>
+        </p:nvCxnSpPr>
+        <p:spPr>
+          <a:xfrm flipH="1" flipV="1">
+            <a:off x="5842934" y="927186"/>
+            <a:ext cx="3468022" cy="400861"/>
+          </a:xfrm>
+          <a:prstGeom prst="straightConnector1">
+            <a:avLst/>
+          </a:prstGeom>
+          <a:ln w="28575">
+            <a:prstDash val="dash"/>
+            <a:tailEnd type="triangle"/>
+          </a:ln>
+          <a:effectLst>
+            <a:outerShdw blurRad="50800" dist="38100" dir="2700000" algn="tl" rotWithShape="0">
+              <a:prstClr val="black">
+                <a:alpha val="40000"/>
+              </a:prstClr>
+            </a:outerShdw>
+          </a:effectLst>
+        </p:spPr>
+        <p:style>
+          <a:lnRef idx="3">
+            <a:schemeClr val="accent6"/>
+          </a:lnRef>
+          <a:fillRef idx="0">
+            <a:schemeClr val="accent6"/>
+          </a:fillRef>
+          <a:effectRef idx="2">
+            <a:schemeClr val="accent6"/>
+          </a:effectRef>
+          <a:fontRef idx="minor">
+            <a:schemeClr val="tx1"/>
+          </a:fontRef>
+        </p:style>
+      </p:cxnSp>
+      <p:sp>
+        <p:nvSpPr>
+          <p:cNvPr id="9" name="TextBox 8">
+            <a:extLst>
+              <a:ext uri="{FF2B5EF4-FFF2-40B4-BE49-F238E27FC236}">
+                <a16:creationId xmlns:a16="http://schemas.microsoft.com/office/drawing/2014/main" id="{760662B0-FCF2-4FB4-B550-BCEDCABA7A97}"/>
+              </a:ext>
+            </a:extLst>
+          </p:cNvPr>
+          <p:cNvSpPr txBox="1"/>
+          <p:nvPr/>
+        </p:nvSpPr>
+        <p:spPr>
+          <a:xfrm>
+            <a:off x="4767769" y="557854"/>
+            <a:ext cx="2150330" cy="369332"/>
+          </a:xfrm>
+          <a:prstGeom prst="rect">
+            <a:avLst/>
+          </a:prstGeom>
+        </p:spPr>
+        <p:style>
+          <a:lnRef idx="0">
+            <a:schemeClr val="accent5"/>
+          </a:lnRef>
+          <a:fillRef idx="3">
+            <a:schemeClr val="accent5"/>
+          </a:fillRef>
+          <a:effectRef idx="3">
+            <a:schemeClr val="accent5"/>
+          </a:effectRef>
+          <a:fontRef idx="minor">
+            <a:schemeClr val="lt1"/>
+          </a:fontRef>
+        </p:style>
+        <p:txBody>
+          <a:bodyPr wrap="square" rtlCol="0">
+            <a:spAutoFit/>
+          </a:bodyPr>
+          <a:lstStyle/>
+          <a:p>
+            <a:pPr algn="ctr"/>
+            <a:r>
+              <a:rPr lang="en-US" b="1" dirty="0"/>
+              <a:t>root (seed)</a:t>
+            </a:r>
+            <a:endParaRPr lang="en-US" dirty="0"/>
+          </a:p>
+        </p:txBody>
+      </p:sp>
+    </p:spTree>
+    <p:extLst>
+      <p:ext uri="{BB962C8B-B14F-4D97-AF65-F5344CB8AC3E}">
+        <p14:creationId xmlns:p14="http://schemas.microsoft.com/office/powerpoint/2010/main" val="2631253672"/>
+      </p:ext>
+    </p:extLst>
+  </p:cSld>
+  <p:clrMapOvr>
+    <a:masterClrMapping/>
+  </p:clrMapOvr>
+</p:sld>
+</file>
+
 <file path=ppt/theme/theme1.xml><?xml version="1.0" encoding="utf-8"?>
 <a:theme xmlns:a="http://schemas.openxmlformats.org/drawingml/2006/main" name="Office Theme">
   <a:themeElements>

</xml_diff>